<commit_message>
Update ISSR_DarkWeb - Final Presentation.pptx
</commit_message>
<xml_diff>
--- a/ISSR_DarkWeb - Final Presentation.pptx
+++ b/ISSR_DarkWeb - Final Presentation.pptx
@@ -10223,7 +10223,7 @@
         </p:nvSpPr>
         <p:spPr>
           <a:xfrm>
-            <a:off x="1677475" y="2785958"/>
+            <a:off x="1805799" y="2769200"/>
             <a:ext cx="5361300" cy="522600"/>
           </a:xfrm>
           <a:prstGeom prst="rect">
@@ -10249,7 +10249,7 @@
               <a:buNone/>
             </a:pPr>
             <a:r>
-              <a:rPr lang="it" sz="2400">
+              <a:rPr lang="it" sz="2400" dirty="0">
                 <a:solidFill>
                   <a:srgbClr val="000000"/>
                 </a:solidFill>
@@ -10261,7 +10261,7 @@
               <a:t>Mentor: </a:t>
             </a:r>
             <a:r>
-              <a:rPr lang="it" sz="2400">
+              <a:rPr lang="it" sz="2400" dirty="0">
                 <a:solidFill>
                   <a:srgbClr val="202124"/>
                 </a:solidFill>
@@ -10273,9 +10273,9 @@
                 <a:cs typeface="Arial"/>
                 <a:sym typeface="Arial"/>
               </a:rPr>
-              <a:t>Andrea Underhill, Jane Daquin</a:t>
+              <a:t>Jane Daquin</a:t>
             </a:r>
-            <a:endParaRPr/>
+            <a:endParaRPr dirty="0"/>
           </a:p>
         </p:txBody>
       </p:sp>

</xml_diff>